<commit_message>
added packages for tests
</commit_message>
<xml_diff>
--- a/Selenide.pptx
+++ b/Selenide.pptx
@@ -5,10 +5,10 @@
     <p:sldMasterId id="2147483763" r:id="rId1"/>
   </p:sldMasterIdLst>
   <p:notesMasterIdLst>
-    <p:notesMasterId r:id="rId20"/>
+    <p:notesMasterId r:id="rId21"/>
   </p:notesMasterIdLst>
   <p:handoutMasterIdLst>
-    <p:handoutMasterId r:id="rId21"/>
+    <p:handoutMasterId r:id="rId22"/>
   </p:handoutMasterIdLst>
   <p:sldIdLst>
     <p:sldId id="374" r:id="rId2"/>
@@ -16,19 +16,20 @@
     <p:sldId id="359" r:id="rId4"/>
     <p:sldId id="361" r:id="rId5"/>
     <p:sldId id="362" r:id="rId6"/>
-    <p:sldId id="378" r:id="rId7"/>
-    <p:sldId id="379" r:id="rId8"/>
-    <p:sldId id="380" r:id="rId9"/>
-    <p:sldId id="381" r:id="rId10"/>
-    <p:sldId id="382" r:id="rId11"/>
-    <p:sldId id="383" r:id="rId12"/>
-    <p:sldId id="384" r:id="rId13"/>
-    <p:sldId id="385" r:id="rId14"/>
-    <p:sldId id="386" r:id="rId15"/>
-    <p:sldId id="387" r:id="rId16"/>
-    <p:sldId id="388" r:id="rId17"/>
-    <p:sldId id="377" r:id="rId18"/>
-    <p:sldId id="375" r:id="rId19"/>
+    <p:sldId id="389" r:id="rId7"/>
+    <p:sldId id="378" r:id="rId8"/>
+    <p:sldId id="379" r:id="rId9"/>
+    <p:sldId id="380" r:id="rId10"/>
+    <p:sldId id="381" r:id="rId11"/>
+    <p:sldId id="382" r:id="rId12"/>
+    <p:sldId id="383" r:id="rId13"/>
+    <p:sldId id="384" r:id="rId14"/>
+    <p:sldId id="385" r:id="rId15"/>
+    <p:sldId id="386" r:id="rId16"/>
+    <p:sldId id="387" r:id="rId17"/>
+    <p:sldId id="388" r:id="rId18"/>
+    <p:sldId id="377" r:id="rId19"/>
+    <p:sldId id="375" r:id="rId20"/>
   </p:sldIdLst>
   <p:sldSz cx="9144000" cy="6858000" type="screen4x3"/>
   <p:notesSz cx="6858000" cy="9144000"/>
@@ -141,6 +142,7 @@
             <p14:sldId id="359"/>
             <p14:sldId id="361"/>
             <p14:sldId id="362"/>
+            <p14:sldId id="389"/>
             <p14:sldId id="378"/>
             <p14:sldId id="379"/>
             <p14:sldId id="380"/>
@@ -272,7 +274,7 @@
             <a:fld id="{EA9F7FF7-50CD-D74F-8521-E72DB68B670C}" type="datetimeFigureOut">
               <a:rPr lang="en-US" smtClean="0"/>
               <a:pPr/>
-              <a:t>2/16/2018</a:t>
+              <a:t>2/20/2018</a:t>
             </a:fld>
             <a:endParaRPr lang="en-US"/>
           </a:p>
@@ -440,7 +442,7 @@
             <a:fld id="{9DD1DD9B-E140-4D76-B427-DF4838D859EA}" type="datetimeFigureOut">
               <a:rPr lang="en-US" smtClean="0"/>
               <a:pPr/>
-              <a:t>2/16/2018</a:t>
+              <a:t>2/20/2018</a:t>
             </a:fld>
             <a:endParaRPr lang="en-US"/>
           </a:p>
@@ -4848,11 +4850,7 @@
           <a:p>
             <a:r>
               <a:rPr lang="en-US" dirty="0" smtClean="0"/>
-              <a:t>March 1</a:t>
-            </a:r>
-            <a:r>
-              <a:rPr lang="en-US" dirty="0" smtClean="0"/>
-              <a:t>, 2018</a:t>
+              <a:t>March 1, 2018</a:t>
             </a:r>
             <a:endParaRPr lang="en-US" dirty="0"/>
           </a:p>
@@ -4946,6 +4944,105 @@
         </p:blipFill>
         <p:spPr>
           <a:xfrm>
+            <a:off x="494251" y="2133600"/>
+            <a:ext cx="7730825" cy="2774324"/>
+          </a:xfrm>
+        </p:spPr>
+      </p:pic>
+      <p:sp>
+        <p:nvSpPr>
+          <p:cNvPr id="3" name="Text Placeholder 2"/>
+          <p:cNvSpPr>
+            <a:spLocks noGrp="1"/>
+          </p:cNvSpPr>
+          <p:nvPr>
+            <p:ph type="body" sz="quarter" idx="10"/>
+          </p:nvPr>
+        </p:nvSpPr>
+        <p:spPr/>
+        <p:txBody>
+          <a:bodyPr>
+            <a:normAutofit lnSpcReduction="10000"/>
+          </a:bodyPr>
+          <a:lstStyle/>
+          <a:p>
+            <a:endParaRPr lang="en-US" b="1" dirty="0" smtClean="0"/>
+          </a:p>
+          <a:p>
+            <a:r>
+              <a:rPr lang="en-US" b="1" dirty="0" smtClean="0">
+                <a:latin typeface="Calibri" panose="020F0502020204030204" pitchFamily="34" charset="0"/>
+                <a:cs typeface="Calibri" panose="020F0502020204030204" pitchFamily="34" charset="0"/>
+              </a:rPr>
+              <a:t>Assert </a:t>
+            </a:r>
+            <a:r>
+              <a:rPr lang="en-US" b="1" dirty="0">
+                <a:latin typeface="Calibri" panose="020F0502020204030204" pitchFamily="34" charset="0"/>
+                <a:cs typeface="Calibri" panose="020F0502020204030204" pitchFamily="34" charset="0"/>
+              </a:rPr>
+              <a:t>that element has a correct text</a:t>
+            </a:r>
+          </a:p>
+          <a:p>
+            <a:endParaRPr lang="en-US" dirty="0"/>
+          </a:p>
+        </p:txBody>
+      </p:sp>
+    </p:spTree>
+    <p:extLst>
+      <p:ext uri="{BB962C8B-B14F-4D97-AF65-F5344CB8AC3E}">
+        <p14:creationId xmlns:p14="http://schemas.microsoft.com/office/powerpoint/2010/main" val="912168745"/>
+      </p:ext>
+    </p:extLst>
+  </p:cSld>
+  <p:clrMapOvr>
+    <a:masterClrMapping/>
+  </p:clrMapOvr>
+</p:sld>
+</file>
+
+<file path=ppt/slides/slide11.xml><?xml version="1.0" encoding="utf-8"?>
+<p:sld xmlns:a="http://schemas.openxmlformats.org/drawingml/2006/main" xmlns:r="http://schemas.openxmlformats.org/officeDocument/2006/relationships" xmlns:p="http://schemas.openxmlformats.org/presentationml/2006/main">
+  <p:cSld>
+    <p:spTree>
+      <p:nvGrpSpPr>
+        <p:cNvPr id="1" name=""/>
+        <p:cNvGrpSpPr/>
+        <p:nvPr/>
+      </p:nvGrpSpPr>
+      <p:grpSpPr>
+        <a:xfrm>
+          <a:off x="0" y="0"/>
+          <a:ext cx="0" cy="0"/>
+          <a:chOff x="0" y="0"/>
+          <a:chExt cx="0" cy="0"/>
+        </a:xfrm>
+      </p:grpSpPr>
+      <p:pic>
+        <p:nvPicPr>
+          <p:cNvPr id="4" name="Content Placeholder 3"/>
+          <p:cNvPicPr>
+            <a:picLocks noGrp="1" noChangeAspect="1"/>
+          </p:cNvPicPr>
+          <p:nvPr>
+            <p:ph idx="1"/>
+          </p:nvPr>
+        </p:nvPicPr>
+        <p:blipFill>
+          <a:blip r:embed="rId2">
+            <a:extLst>
+              <a:ext uri="{28A0092B-C50C-407E-A947-70E740481C1C}">
+                <a14:useLocalDpi xmlns:a14="http://schemas.microsoft.com/office/drawing/2010/main" val="0"/>
+              </a:ext>
+            </a:extLst>
+          </a:blip>
+          <a:stretch>
+            <a:fillRect/>
+          </a:stretch>
+        </p:blipFill>
+        <p:spPr>
+          <a:xfrm>
             <a:off x="1295400" y="1264505"/>
             <a:ext cx="6227263" cy="4701320"/>
           </a:xfrm>
@@ -5004,7 +5101,7 @@
 </p:sld>
 </file>
 
-<file path=ppt/slides/slide11.xml><?xml version="1.0" encoding="utf-8"?>
+<file path=ppt/slides/slide12.xml><?xml version="1.0" encoding="utf-8"?>
 <p:sld xmlns:a="http://schemas.openxmlformats.org/drawingml/2006/main" xmlns:r="http://schemas.openxmlformats.org/officeDocument/2006/relationships" xmlns:p="http://schemas.openxmlformats.org/presentationml/2006/main">
   <p:cSld>
     <p:spTree>
@@ -5103,7 +5200,7 @@
 </p:sld>
 </file>
 
-<file path=ppt/slides/slide12.xml><?xml version="1.0" encoding="utf-8"?>
+<file path=ppt/slides/slide13.xml><?xml version="1.0" encoding="utf-8"?>
 <p:sld xmlns:a="http://schemas.openxmlformats.org/drawingml/2006/main" xmlns:r="http://schemas.openxmlformats.org/officeDocument/2006/relationships" xmlns:p="http://schemas.openxmlformats.org/presentationml/2006/main">
   <p:cSld>
     <p:spTree>
@@ -5202,7 +5299,7 @@
 </p:sld>
 </file>
 
-<file path=ppt/slides/slide13.xml><?xml version="1.0" encoding="utf-8"?>
+<file path=ppt/slides/slide14.xml><?xml version="1.0" encoding="utf-8"?>
 <p:sld xmlns:a="http://schemas.openxmlformats.org/drawingml/2006/main" xmlns:r="http://schemas.openxmlformats.org/officeDocument/2006/relationships" xmlns:p="http://schemas.openxmlformats.org/presentationml/2006/main">
   <p:cSld>
     <p:spTree>
@@ -5301,7 +5398,7 @@
 </p:sld>
 </file>
 
-<file path=ppt/slides/slide14.xml><?xml version="1.0" encoding="utf-8"?>
+<file path=ppt/slides/slide15.xml><?xml version="1.0" encoding="utf-8"?>
 <p:sld xmlns:a="http://schemas.openxmlformats.org/drawingml/2006/main" xmlns:r="http://schemas.openxmlformats.org/officeDocument/2006/relationships" xmlns:p="http://schemas.openxmlformats.org/presentationml/2006/main">
   <p:cSld>
     <p:spTree>
@@ -5400,7 +5497,7 @@
 </p:sld>
 </file>
 
-<file path=ppt/slides/slide15.xml><?xml version="1.0" encoding="utf-8"?>
+<file path=ppt/slides/slide16.xml><?xml version="1.0" encoding="utf-8"?>
 <p:sld xmlns:a="http://schemas.openxmlformats.org/drawingml/2006/main" xmlns:r="http://schemas.openxmlformats.org/officeDocument/2006/relationships" xmlns:p="http://schemas.openxmlformats.org/presentationml/2006/main">
   <p:cSld>
     <p:spTree>
@@ -5499,7 +5596,7 @@
 </p:sld>
 </file>
 
-<file path=ppt/slides/slide16.xml><?xml version="1.0" encoding="utf-8"?>
+<file path=ppt/slides/slide17.xml><?xml version="1.0" encoding="utf-8"?>
 <p:sld xmlns:a="http://schemas.openxmlformats.org/drawingml/2006/main" xmlns:r="http://schemas.openxmlformats.org/officeDocument/2006/relationships" xmlns:p="http://schemas.openxmlformats.org/presentationml/2006/main">
   <p:cSld>
     <p:spTree>
@@ -5598,7 +5695,7 @@
 </p:sld>
 </file>
 
-<file path=ppt/slides/slide17.xml><?xml version="1.0" encoding="utf-8"?>
+<file path=ppt/slides/slide18.xml><?xml version="1.0" encoding="utf-8"?>
 <p:sld xmlns:a="http://schemas.openxmlformats.org/drawingml/2006/main" xmlns:r="http://schemas.openxmlformats.org/officeDocument/2006/relationships" xmlns:p="http://schemas.openxmlformats.org/presentationml/2006/main">
   <p:cSld>
     <p:spTree>
@@ -5687,7 +5784,7 @@
 </p:sld>
 </file>
 
-<file path=ppt/slides/slide18.xml><?xml version="1.0" encoding="utf-8"?>
+<file path=ppt/slides/slide19.xml><?xml version="1.0" encoding="utf-8"?>
 <p:sld xmlns:a="http://schemas.openxmlformats.org/drawingml/2006/main" xmlns:r="http://schemas.openxmlformats.org/officeDocument/2006/relationships" xmlns:p="http://schemas.openxmlformats.org/presentationml/2006/main">
   <p:cSld>
     <p:spTree>
@@ -8528,6 +8625,388 @@
           <a:chExt cx="0" cy="0"/>
         </a:xfrm>
       </p:grpSpPr>
+      <p:sp>
+        <p:nvSpPr>
+          <p:cNvPr id="2" name="Content Placeholder 1"/>
+          <p:cNvSpPr>
+            <a:spLocks noGrp="1"/>
+          </p:cNvSpPr>
+          <p:nvPr>
+            <p:ph idx="1"/>
+          </p:nvPr>
+        </p:nvSpPr>
+        <p:spPr/>
+        <p:txBody>
+          <a:bodyPr/>
+          <a:lstStyle/>
+          <a:p>
+            <a:pPr marL="0" indent="0">
+              <a:buNone/>
+            </a:pPr>
+            <a:r>
+              <a:rPr lang="en-US" dirty="0" smtClean="0"/>
+              <a:t>Cons:</a:t>
+            </a:r>
+          </a:p>
+          <a:p>
+            <a:pPr marL="0" indent="0">
+              <a:buNone/>
+            </a:pPr>
+            <a:r>
+              <a:rPr lang="en-US" dirty="0"/>
+              <a:t>	</a:t>
+            </a:r>
+            <a:endParaRPr lang="en-US" dirty="0" smtClean="0"/>
+          </a:p>
+          <a:p>
+            <a:endParaRPr lang="en-US" dirty="0"/>
+          </a:p>
+        </p:txBody>
+      </p:sp>
+      <p:sp>
+        <p:nvSpPr>
+          <p:cNvPr id="3" name="Text Placeholder 2"/>
+          <p:cNvSpPr>
+            <a:spLocks noGrp="1"/>
+          </p:cNvSpPr>
+          <p:nvPr>
+            <p:ph type="body" sz="quarter" idx="10"/>
+          </p:nvPr>
+        </p:nvSpPr>
+        <p:spPr/>
+        <p:txBody>
+          <a:bodyPr/>
+          <a:lstStyle/>
+          <a:p>
+            <a:r>
+              <a:rPr lang="en-US" dirty="0"/>
+              <a:t>Pros and cons</a:t>
+            </a:r>
+          </a:p>
+          <a:p>
+            <a:endParaRPr lang="en-US" dirty="0"/>
+          </a:p>
+        </p:txBody>
+      </p:sp>
+      <p:grpSp>
+        <p:nvGrpSpPr>
+          <p:cNvPr id="4" name="Group 3"/>
+          <p:cNvGrpSpPr/>
+          <p:nvPr/>
+        </p:nvGrpSpPr>
+        <p:grpSpPr>
+          <a:xfrm>
+            <a:off x="685800" y="1890332"/>
+            <a:ext cx="4052934" cy="369332"/>
+            <a:chOff x="448467" y="1365788"/>
+            <a:chExt cx="5403912" cy="492442"/>
+          </a:xfrm>
+        </p:grpSpPr>
+        <p:sp>
+          <p:nvSpPr>
+            <p:cNvPr id="5" name="TextBox 4"/>
+            <p:cNvSpPr txBox="1"/>
+            <p:nvPr/>
+          </p:nvSpPr>
+          <p:spPr>
+            <a:xfrm>
+              <a:off x="928175" y="1365788"/>
+              <a:ext cx="4924204" cy="492442"/>
+            </a:xfrm>
+            <a:prstGeom prst="rect">
+              <a:avLst/>
+            </a:prstGeom>
+            <a:noFill/>
+          </p:spPr>
+          <p:txBody>
+            <a:bodyPr wrap="square" rtlCol="0">
+              <a:spAutoFit/>
+            </a:bodyPr>
+            <a:lstStyle/>
+            <a:p>
+              <a:r>
+                <a:rPr lang="en-US" sz="1800" dirty="0"/>
+                <a:t>The driver runs in a single thread</a:t>
+              </a:r>
+              <a:endParaRPr lang="en-US" sz="1800" dirty="0"/>
+            </a:p>
+          </p:txBody>
+        </p:sp>
+        <p:grpSp>
+          <p:nvGrpSpPr>
+            <p:cNvPr id="6" name="Group 5"/>
+            <p:cNvGrpSpPr/>
+            <p:nvPr/>
+          </p:nvGrpSpPr>
+          <p:grpSpPr>
+            <a:xfrm>
+              <a:off x="448467" y="1385345"/>
+              <a:ext cx="464582" cy="464582"/>
+              <a:chOff x="448467" y="1385718"/>
+              <a:chExt cx="464582" cy="464582"/>
+            </a:xfrm>
+          </p:grpSpPr>
+          <p:sp>
+            <p:nvSpPr>
+              <p:cNvPr id="7" name="Oval 6"/>
+              <p:cNvSpPr/>
+              <p:nvPr/>
+            </p:nvSpPr>
+            <p:spPr>
+              <a:xfrm>
+                <a:off x="448467" y="1385718"/>
+                <a:ext cx="464582" cy="464582"/>
+              </a:xfrm>
+              <a:prstGeom prst="ellipse">
+                <a:avLst/>
+              </a:prstGeom>
+              <a:solidFill>
+                <a:srgbClr val="2FC2D9"/>
+              </a:solidFill>
+              <a:ln>
+                <a:noFill/>
+              </a:ln>
+              <a:effectLst/>
+            </p:spPr>
+            <p:style>
+              <a:lnRef idx="1">
+                <a:schemeClr val="accent1"/>
+              </a:lnRef>
+              <a:fillRef idx="3">
+                <a:schemeClr val="accent1"/>
+              </a:fillRef>
+              <a:effectRef idx="2">
+                <a:schemeClr val="accent1"/>
+              </a:effectRef>
+              <a:fontRef idx="minor">
+                <a:schemeClr val="lt1"/>
+              </a:fontRef>
+            </p:style>
+            <p:txBody>
+              <a:bodyPr rtlCol="0" anchor="ctr"/>
+              <a:lstStyle/>
+              <a:p>
+                <a:pPr algn="ctr"/>
+                <a:endParaRPr lang="en-US" dirty="0"/>
+              </a:p>
+            </p:txBody>
+          </p:sp>
+          <p:sp>
+            <p:nvSpPr>
+              <p:cNvPr id="8" name="TextBox 7"/>
+              <p:cNvSpPr txBox="1"/>
+              <p:nvPr/>
+            </p:nvSpPr>
+            <p:spPr>
+              <a:xfrm>
+                <a:off x="470439" y="1427189"/>
+                <a:ext cx="417291" cy="406265"/>
+              </a:xfrm>
+              <a:prstGeom prst="rect">
+                <a:avLst/>
+              </a:prstGeom>
+              <a:noFill/>
+            </p:spPr>
+            <p:txBody>
+              <a:bodyPr wrap="none" tIns="27432" rtlCol="0">
+                <a:spAutoFit/>
+              </a:bodyPr>
+              <a:lstStyle/>
+              <a:p>
+                <a:pPr algn="ctr"/>
+                <a:r>
+                  <a:rPr lang="en-US" sz="1500" b="1" dirty="0">
+                    <a:solidFill>
+                      <a:schemeClr val="bg1"/>
+                    </a:solidFill>
+                    <a:latin typeface="Arial Black"/>
+                    <a:cs typeface="Arial Black"/>
+                  </a:rPr>
+                  <a:t>1</a:t>
+                </a:r>
+              </a:p>
+            </p:txBody>
+          </p:sp>
+        </p:grpSp>
+      </p:grpSp>
+      <p:grpSp>
+        <p:nvGrpSpPr>
+          <p:cNvPr id="9" name="Group 8"/>
+          <p:cNvGrpSpPr/>
+          <p:nvPr/>
+        </p:nvGrpSpPr>
+        <p:grpSpPr>
+          <a:xfrm>
+            <a:off x="702279" y="2416437"/>
+            <a:ext cx="4052934" cy="369332"/>
+            <a:chOff x="448467" y="1365788"/>
+            <a:chExt cx="5403912" cy="492442"/>
+          </a:xfrm>
+        </p:grpSpPr>
+        <p:sp>
+          <p:nvSpPr>
+            <p:cNvPr id="10" name="TextBox 9"/>
+            <p:cNvSpPr txBox="1"/>
+            <p:nvPr/>
+          </p:nvSpPr>
+          <p:spPr>
+            <a:xfrm>
+              <a:off x="928175" y="1365788"/>
+              <a:ext cx="4924204" cy="492442"/>
+            </a:xfrm>
+            <a:prstGeom prst="rect">
+              <a:avLst/>
+            </a:prstGeom>
+            <a:noFill/>
+          </p:spPr>
+          <p:txBody>
+            <a:bodyPr wrap="square" rtlCol="0">
+              <a:spAutoFit/>
+            </a:bodyPr>
+            <a:lstStyle/>
+            <a:p>
+              <a:r>
+                <a:rPr lang="en-US" sz="1800" dirty="0" smtClean="0"/>
+                <a:t>Based on static methods</a:t>
+              </a:r>
+              <a:endParaRPr lang="en-US" sz="1800" dirty="0"/>
+            </a:p>
+          </p:txBody>
+        </p:sp>
+        <p:grpSp>
+          <p:nvGrpSpPr>
+            <p:cNvPr id="11" name="Group 10"/>
+            <p:cNvGrpSpPr/>
+            <p:nvPr/>
+          </p:nvGrpSpPr>
+          <p:grpSpPr>
+            <a:xfrm>
+              <a:off x="448467" y="1385345"/>
+              <a:ext cx="464582" cy="464582"/>
+              <a:chOff x="448467" y="1385718"/>
+              <a:chExt cx="464582" cy="464582"/>
+            </a:xfrm>
+          </p:grpSpPr>
+          <p:sp>
+            <p:nvSpPr>
+              <p:cNvPr id="12" name="Oval 11"/>
+              <p:cNvSpPr/>
+              <p:nvPr/>
+            </p:nvSpPr>
+            <p:spPr>
+              <a:xfrm>
+                <a:off x="448467" y="1385718"/>
+                <a:ext cx="464582" cy="464582"/>
+              </a:xfrm>
+              <a:prstGeom prst="ellipse">
+                <a:avLst/>
+              </a:prstGeom>
+              <a:solidFill>
+                <a:srgbClr val="2FC2D9"/>
+              </a:solidFill>
+              <a:ln>
+                <a:noFill/>
+              </a:ln>
+              <a:effectLst/>
+            </p:spPr>
+            <p:style>
+              <a:lnRef idx="1">
+                <a:schemeClr val="accent1"/>
+              </a:lnRef>
+              <a:fillRef idx="3">
+                <a:schemeClr val="accent1"/>
+              </a:fillRef>
+              <a:effectRef idx="2">
+                <a:schemeClr val="accent1"/>
+              </a:effectRef>
+              <a:fontRef idx="minor">
+                <a:schemeClr val="lt1"/>
+              </a:fontRef>
+            </p:style>
+            <p:txBody>
+              <a:bodyPr rtlCol="0" anchor="ctr"/>
+              <a:lstStyle/>
+              <a:p>
+                <a:pPr algn="ctr"/>
+                <a:endParaRPr lang="en-US" dirty="0"/>
+              </a:p>
+            </p:txBody>
+          </p:sp>
+          <p:sp>
+            <p:nvSpPr>
+              <p:cNvPr id="13" name="TextBox 12"/>
+              <p:cNvSpPr txBox="1"/>
+              <p:nvPr/>
+            </p:nvSpPr>
+            <p:spPr>
+              <a:xfrm>
+                <a:off x="470480" y="1427189"/>
+                <a:ext cx="417209" cy="406265"/>
+              </a:xfrm>
+              <a:prstGeom prst="rect">
+                <a:avLst/>
+              </a:prstGeom>
+              <a:noFill/>
+            </p:spPr>
+            <p:txBody>
+              <a:bodyPr wrap="none" tIns="27432" rtlCol="0">
+                <a:spAutoFit/>
+              </a:bodyPr>
+              <a:lstStyle/>
+              <a:p>
+                <a:pPr algn="ctr"/>
+                <a:r>
+                  <a:rPr lang="en-US" sz="1500" b="1" dirty="0">
+                    <a:solidFill>
+                      <a:schemeClr val="bg1"/>
+                    </a:solidFill>
+                    <a:latin typeface="Arial Black"/>
+                    <a:cs typeface="Arial Black"/>
+                  </a:rPr>
+                  <a:t>2</a:t>
+                </a:r>
+                <a:endParaRPr lang="en-US" sz="1500" b="1" dirty="0">
+                  <a:solidFill>
+                    <a:schemeClr val="bg1"/>
+                  </a:solidFill>
+                  <a:latin typeface="Arial Black"/>
+                  <a:cs typeface="Arial Black"/>
+                </a:endParaRPr>
+              </a:p>
+            </p:txBody>
+          </p:sp>
+        </p:grpSp>
+      </p:grpSp>
+    </p:spTree>
+    <p:extLst>
+      <p:ext uri="{BB962C8B-B14F-4D97-AF65-F5344CB8AC3E}">
+        <p14:creationId xmlns:p14="http://schemas.microsoft.com/office/powerpoint/2010/main" val="3060843446"/>
+      </p:ext>
+    </p:extLst>
+  </p:cSld>
+  <p:clrMapOvr>
+    <a:masterClrMapping/>
+  </p:clrMapOvr>
+</p:sld>
+</file>
+
+<file path=ppt/slides/slide7.xml><?xml version="1.0" encoding="utf-8"?>
+<p:sld xmlns:a="http://schemas.openxmlformats.org/drawingml/2006/main" xmlns:r="http://schemas.openxmlformats.org/officeDocument/2006/relationships" xmlns:p="http://schemas.openxmlformats.org/presentationml/2006/main">
+  <p:cSld>
+    <p:spTree>
+      <p:nvGrpSpPr>
+        <p:cNvPr id="1" name=""/>
+        <p:cNvGrpSpPr/>
+        <p:nvPr/>
+      </p:nvGrpSpPr>
+      <p:grpSpPr>
+        <a:xfrm>
+          <a:off x="0" y="0"/>
+          <a:ext cx="0" cy="0"/>
+          <a:chOff x="0" y="0"/>
+          <a:chExt cx="0" cy="0"/>
+        </a:xfrm>
+      </p:grpSpPr>
       <p:pic>
         <p:nvPicPr>
           <p:cNvPr id="4" name="Content Placeholder 3"/>
@@ -8613,7 +9092,7 @@
 </p:sld>
 </file>
 
-<file path=ppt/slides/slide7.xml><?xml version="1.0" encoding="utf-8"?>
+<file path=ppt/slides/slide8.xml><?xml version="1.0" encoding="utf-8"?>
 <p:sld xmlns:a="http://schemas.openxmlformats.org/drawingml/2006/main" xmlns:r="http://schemas.openxmlformats.org/officeDocument/2006/relationships" xmlns:p="http://schemas.openxmlformats.org/presentationml/2006/main">
   <p:cSld>
     <p:spTree>
@@ -8712,7 +9191,7 @@
 </p:sld>
 </file>
 
-<file path=ppt/slides/slide8.xml><?xml version="1.0" encoding="utf-8"?>
+<file path=ppt/slides/slide9.xml><?xml version="1.0" encoding="utf-8"?>
 <p:sld xmlns:a="http://schemas.openxmlformats.org/drawingml/2006/main" xmlns:r="http://schemas.openxmlformats.org/officeDocument/2006/relationships" xmlns:p="http://schemas.openxmlformats.org/presentationml/2006/main">
   <p:cSld>
     <p:spTree>
@@ -8802,105 +9281,6 @@
     <p:extLst>
       <p:ext uri="{BB962C8B-B14F-4D97-AF65-F5344CB8AC3E}">
         <p14:creationId xmlns:p14="http://schemas.microsoft.com/office/powerpoint/2010/main" val="1131496229"/>
-      </p:ext>
-    </p:extLst>
-  </p:cSld>
-  <p:clrMapOvr>
-    <a:masterClrMapping/>
-  </p:clrMapOvr>
-</p:sld>
-</file>
-
-<file path=ppt/slides/slide9.xml><?xml version="1.0" encoding="utf-8"?>
-<p:sld xmlns:a="http://schemas.openxmlformats.org/drawingml/2006/main" xmlns:r="http://schemas.openxmlformats.org/officeDocument/2006/relationships" xmlns:p="http://schemas.openxmlformats.org/presentationml/2006/main">
-  <p:cSld>
-    <p:spTree>
-      <p:nvGrpSpPr>
-        <p:cNvPr id="1" name=""/>
-        <p:cNvGrpSpPr/>
-        <p:nvPr/>
-      </p:nvGrpSpPr>
-      <p:grpSpPr>
-        <a:xfrm>
-          <a:off x="0" y="0"/>
-          <a:ext cx="0" cy="0"/>
-          <a:chOff x="0" y="0"/>
-          <a:chExt cx="0" cy="0"/>
-        </a:xfrm>
-      </p:grpSpPr>
-      <p:pic>
-        <p:nvPicPr>
-          <p:cNvPr id="4" name="Content Placeholder 3"/>
-          <p:cNvPicPr>
-            <a:picLocks noGrp="1" noChangeAspect="1"/>
-          </p:cNvPicPr>
-          <p:nvPr>
-            <p:ph idx="1"/>
-          </p:nvPr>
-        </p:nvPicPr>
-        <p:blipFill>
-          <a:blip r:embed="rId2">
-            <a:extLst>
-              <a:ext uri="{28A0092B-C50C-407E-A947-70E740481C1C}">
-                <a14:useLocalDpi xmlns:a14="http://schemas.microsoft.com/office/drawing/2010/main" val="0"/>
-              </a:ext>
-            </a:extLst>
-          </a:blip>
-          <a:stretch>
-            <a:fillRect/>
-          </a:stretch>
-        </p:blipFill>
-        <p:spPr>
-          <a:xfrm>
-            <a:off x="494251" y="2133600"/>
-            <a:ext cx="7730825" cy="2774324"/>
-          </a:xfrm>
-        </p:spPr>
-      </p:pic>
-      <p:sp>
-        <p:nvSpPr>
-          <p:cNvPr id="3" name="Text Placeholder 2"/>
-          <p:cNvSpPr>
-            <a:spLocks noGrp="1"/>
-          </p:cNvSpPr>
-          <p:nvPr>
-            <p:ph type="body" sz="quarter" idx="10"/>
-          </p:nvPr>
-        </p:nvSpPr>
-        <p:spPr/>
-        <p:txBody>
-          <a:bodyPr>
-            <a:normAutofit lnSpcReduction="10000"/>
-          </a:bodyPr>
-          <a:lstStyle/>
-          <a:p>
-            <a:endParaRPr lang="en-US" b="1" dirty="0" smtClean="0"/>
-          </a:p>
-          <a:p>
-            <a:r>
-              <a:rPr lang="en-US" b="1" dirty="0" smtClean="0">
-                <a:latin typeface="Calibri" panose="020F0502020204030204" pitchFamily="34" charset="0"/>
-                <a:cs typeface="Calibri" panose="020F0502020204030204" pitchFamily="34" charset="0"/>
-              </a:rPr>
-              <a:t>Assert </a:t>
-            </a:r>
-            <a:r>
-              <a:rPr lang="en-US" b="1" dirty="0">
-                <a:latin typeface="Calibri" panose="020F0502020204030204" pitchFamily="34" charset="0"/>
-                <a:cs typeface="Calibri" panose="020F0502020204030204" pitchFamily="34" charset="0"/>
-              </a:rPr>
-              <a:t>that element has a correct text</a:t>
-            </a:r>
-          </a:p>
-          <a:p>
-            <a:endParaRPr lang="en-US" dirty="0"/>
-          </a:p>
-        </p:txBody>
-      </p:sp>
-    </p:spTree>
-    <p:extLst>
-      <p:ext uri="{BB962C8B-B14F-4D97-AF65-F5344CB8AC3E}">
-        <p14:creationId xmlns:p14="http://schemas.microsoft.com/office/powerpoint/2010/main" val="912168745"/>
       </p:ext>
     </p:extLst>
   </p:cSld>

</xml_diff>